<commit_message>
Updated CSS and Question Formatting
</commit_message>
<xml_diff>
--- a/slides/Module 1 - Introduction and Basics.pptx
+++ b/slides/Module 1 - Introduction and Basics.pptx
@@ -243,7 +243,7 @@
           <a:p>
             <a:fld id="{7CDA22E5-D750-424D-96BB-34C5DE65819A}" type="datetimeFigureOut">
               <a:rPr lang="en-US" smtClean="0"/>
-              <a:t>5/30/2023</a:t>
+              <a:t>9/12/2023</a:t>
             </a:fld>
             <a:endParaRPr lang="en-US"/>
           </a:p>
@@ -1094,7 +1094,7 @@
           <a:p>
             <a:fld id="{0FBCDD67-C8A9-42D9-B7C1-D5202BCDE9D3}" type="datetimeFigureOut">
               <a:rPr lang="en-US" smtClean="0"/>
-              <a:t>5/30/2023</a:t>
+              <a:t>9/12/2023</a:t>
             </a:fld>
             <a:endParaRPr lang="en-US"/>
           </a:p>
@@ -1292,7 +1292,7 @@
           <a:p>
             <a:fld id="{0FBCDD67-C8A9-42D9-B7C1-D5202BCDE9D3}" type="datetimeFigureOut">
               <a:rPr lang="en-US" smtClean="0"/>
-              <a:t>5/30/2023</a:t>
+              <a:t>9/12/2023</a:t>
             </a:fld>
             <a:endParaRPr lang="en-US"/>
           </a:p>
@@ -1500,7 +1500,7 @@
           <a:p>
             <a:fld id="{0FBCDD67-C8A9-42D9-B7C1-D5202BCDE9D3}" type="datetimeFigureOut">
               <a:rPr lang="en-US" smtClean="0"/>
-              <a:t>5/30/2023</a:t>
+              <a:t>9/12/2023</a:t>
             </a:fld>
             <a:endParaRPr lang="en-US"/>
           </a:p>
@@ -1698,7 +1698,7 @@
           <a:p>
             <a:fld id="{0FBCDD67-C8A9-42D9-B7C1-D5202BCDE9D3}" type="datetimeFigureOut">
               <a:rPr lang="en-US" smtClean="0"/>
-              <a:t>5/30/2023</a:t>
+              <a:t>9/12/2023</a:t>
             </a:fld>
             <a:endParaRPr lang="en-US"/>
           </a:p>
@@ -1973,7 +1973,7 @@
           <a:p>
             <a:fld id="{0FBCDD67-C8A9-42D9-B7C1-D5202BCDE9D3}" type="datetimeFigureOut">
               <a:rPr lang="en-US" smtClean="0"/>
-              <a:t>5/30/2023</a:t>
+              <a:t>9/12/2023</a:t>
             </a:fld>
             <a:endParaRPr lang="en-US"/>
           </a:p>
@@ -2238,7 +2238,7 @@
           <a:p>
             <a:fld id="{0FBCDD67-C8A9-42D9-B7C1-D5202BCDE9D3}" type="datetimeFigureOut">
               <a:rPr lang="en-US" smtClean="0"/>
-              <a:t>5/30/2023</a:t>
+              <a:t>9/12/2023</a:t>
             </a:fld>
             <a:endParaRPr lang="en-US"/>
           </a:p>
@@ -2650,7 +2650,7 @@
           <a:p>
             <a:fld id="{0FBCDD67-C8A9-42D9-B7C1-D5202BCDE9D3}" type="datetimeFigureOut">
               <a:rPr lang="en-US" smtClean="0"/>
-              <a:t>5/30/2023</a:t>
+              <a:t>9/12/2023</a:t>
             </a:fld>
             <a:endParaRPr lang="en-US"/>
           </a:p>
@@ -2791,7 +2791,7 @@
           <a:p>
             <a:fld id="{0FBCDD67-C8A9-42D9-B7C1-D5202BCDE9D3}" type="datetimeFigureOut">
               <a:rPr lang="en-US" smtClean="0"/>
-              <a:t>5/30/2023</a:t>
+              <a:t>9/12/2023</a:t>
             </a:fld>
             <a:endParaRPr lang="en-US"/>
           </a:p>
@@ -2904,7 +2904,7 @@
           <a:p>
             <a:fld id="{0FBCDD67-C8A9-42D9-B7C1-D5202BCDE9D3}" type="datetimeFigureOut">
               <a:rPr lang="en-US" smtClean="0"/>
-              <a:t>5/30/2023</a:t>
+              <a:t>9/12/2023</a:t>
             </a:fld>
             <a:endParaRPr lang="en-US"/>
           </a:p>
@@ -3215,7 +3215,7 @@
           <a:p>
             <a:fld id="{0FBCDD67-C8A9-42D9-B7C1-D5202BCDE9D3}" type="datetimeFigureOut">
               <a:rPr lang="en-US" smtClean="0"/>
-              <a:t>5/30/2023</a:t>
+              <a:t>9/12/2023</a:t>
             </a:fld>
             <a:endParaRPr lang="en-US"/>
           </a:p>
@@ -3503,7 +3503,7 @@
           <a:p>
             <a:fld id="{0FBCDD67-C8A9-42D9-B7C1-D5202BCDE9D3}" type="datetimeFigureOut">
               <a:rPr lang="en-US" smtClean="0"/>
-              <a:t>5/30/2023</a:t>
+              <a:t>9/12/2023</a:t>
             </a:fld>
             <a:endParaRPr lang="en-US"/>
           </a:p>
@@ -3744,7 +3744,7 @@
           <a:p>
             <a:fld id="{0FBCDD67-C8A9-42D9-B7C1-D5202BCDE9D3}" type="datetimeFigureOut">
               <a:rPr lang="en-US" smtClean="0"/>
-              <a:t>5/30/2023</a:t>
+              <a:t>9/12/2023</a:t>
             </a:fld>
             <a:endParaRPr lang="en-US"/>
           </a:p>

</xml_diff>